<commit_message>
Added a few point animations
</commit_message>
<xml_diff>
--- a/Getting Started with Git/gitting started.pptx
+++ b/Getting Started with Git/gitting started.pptx
@@ -869,7 +869,7 @@
           <a:p>
             <a:fld id="{E1C144AF-6B33-4245-918F-29E6419BE95C}" type="datetimeFigureOut">
               <a:rPr lang="en-US" smtClean="0"/>
-              <a:t>2/28/2019</a:t>
+              <a:t>3/6/2019</a:t>
             </a:fld>
             <a:endParaRPr lang="en-US"/>
           </a:p>
@@ -1053,7 +1053,7 @@
           <a:p>
             <a:fld id="{E1C144AF-6B33-4245-918F-29E6419BE95C}" type="datetimeFigureOut">
               <a:rPr lang="en-US" smtClean="0"/>
-              <a:t>2/28/2019</a:t>
+              <a:t>3/6/2019</a:t>
             </a:fld>
             <a:endParaRPr lang="en-US"/>
           </a:p>
@@ -1233,7 +1233,7 @@
           <a:p>
             <a:fld id="{E1C144AF-6B33-4245-918F-29E6419BE95C}" type="datetimeFigureOut">
               <a:rPr lang="en-US" smtClean="0"/>
-              <a:t>2/28/2019</a:t>
+              <a:t>3/6/2019</a:t>
             </a:fld>
             <a:endParaRPr lang="en-US"/>
           </a:p>
@@ -1408,7 +1408,7 @@
           <a:p>
             <a:fld id="{E1C144AF-6B33-4245-918F-29E6419BE95C}" type="datetimeFigureOut">
               <a:rPr lang="en-US" smtClean="0"/>
-              <a:t>2/28/2019</a:t>
+              <a:t>3/6/2019</a:t>
             </a:fld>
             <a:endParaRPr lang="en-US"/>
           </a:p>
@@ -1721,7 +1721,7 @@
           <a:p>
             <a:fld id="{E1C144AF-6B33-4245-918F-29E6419BE95C}" type="datetimeFigureOut">
               <a:rPr lang="en-US" smtClean="0"/>
-              <a:t>2/28/2019</a:t>
+              <a:t>3/6/2019</a:t>
             </a:fld>
             <a:endParaRPr lang="en-US"/>
           </a:p>
@@ -2112,7 +2112,7 @@
           <a:p>
             <a:fld id="{E1C144AF-6B33-4245-918F-29E6419BE95C}" type="datetimeFigureOut">
               <a:rPr lang="en-US" smtClean="0"/>
-              <a:t>2/28/2019</a:t>
+              <a:t>3/6/2019</a:t>
             </a:fld>
             <a:endParaRPr lang="en-US"/>
           </a:p>
@@ -2546,7 +2546,7 @@
           <a:p>
             <a:fld id="{E1C144AF-6B33-4245-918F-29E6419BE95C}" type="datetimeFigureOut">
               <a:rPr lang="en-US" smtClean="0"/>
-              <a:t>2/28/2019</a:t>
+              <a:t>3/6/2019</a:t>
             </a:fld>
             <a:endParaRPr lang="en-US"/>
           </a:p>
@@ -2664,7 +2664,7 @@
           <a:p>
             <a:fld id="{E1C144AF-6B33-4245-918F-29E6419BE95C}" type="datetimeFigureOut">
               <a:rPr lang="en-US" smtClean="0"/>
-              <a:t>2/28/2019</a:t>
+              <a:t>3/6/2019</a:t>
             </a:fld>
             <a:endParaRPr lang="en-US"/>
           </a:p>
@@ -2759,7 +2759,7 @@
           <a:p>
             <a:fld id="{E1C144AF-6B33-4245-918F-29E6419BE95C}" type="datetimeFigureOut">
               <a:rPr lang="en-US" smtClean="0"/>
-              <a:t>2/28/2019</a:t>
+              <a:t>3/6/2019</a:t>
             </a:fld>
             <a:endParaRPr lang="en-US"/>
           </a:p>
@@ -3109,7 +3109,7 @@
           <a:p>
             <a:fld id="{E1C144AF-6B33-4245-918F-29E6419BE95C}" type="datetimeFigureOut">
               <a:rPr lang="en-US" smtClean="0"/>
-              <a:t>2/28/2019</a:t>
+              <a:t>3/6/2019</a:t>
             </a:fld>
             <a:endParaRPr lang="en-US"/>
           </a:p>
@@ -3534,7 +3534,7 @@
           <a:p>
             <a:fld id="{E1C144AF-6B33-4245-918F-29E6419BE95C}" type="datetimeFigureOut">
               <a:rPr lang="en-US" smtClean="0"/>
-              <a:t>2/28/2019</a:t>
+              <a:t>3/6/2019</a:t>
             </a:fld>
             <a:endParaRPr lang="en-US"/>
           </a:p>
@@ -3815,7 +3815,7 @@
           <a:p>
             <a:fld id="{E1C144AF-6B33-4245-918F-29E6419BE95C}" type="datetimeFigureOut">
               <a:rPr lang="en-US" smtClean="0"/>
-              <a:t>2/28/2019</a:t>
+              <a:t>3/6/2019</a:t>
             </a:fld>
             <a:endParaRPr lang="en-US"/>
           </a:p>
@@ -4469,12 +4469,8 @@
           </a:p>
           <a:p>
             <a:r>
-              <a:rPr lang="en-US" strike="dblStrike" dirty="0"/>
-              <a:t>Contoso Ltd.</a:t>
-            </a:r>
-            <a:r>
               <a:rPr lang="en-US" dirty="0"/>
-              <a:t> Microsoft</a:t>
+              <a:t>Microsoft</a:t>
             </a:r>
           </a:p>
           <a:p>
@@ -4492,13 +4488,13 @@
   <p:clrMapOvr>
     <a:masterClrMapping/>
   </p:clrMapOvr>
-  <mc:AlternateContent xmlns:mc="http://schemas.openxmlformats.org/markup-compatibility/2006">
-    <mc:Choice xmlns:p14="http://schemas.microsoft.com/office/powerpoint/2010/main" Requires="p14">
+  <mc:AlternateContent xmlns:mc="http://schemas.openxmlformats.org/markup-compatibility/2006" xmlns:p14="http://schemas.microsoft.com/office/powerpoint/2010/main">
+    <mc:Choice Requires="p14">
       <p:transition spd="med" p14:dur="700">
         <p:fade/>
       </p:transition>
     </mc:Choice>
-    <mc:Fallback>
+    <mc:Fallback xmlns="">
       <p:transition spd="med">
         <p:fade/>
       </p:transition>
@@ -5700,14 +5696,13 @@
           <a:p>
             <a:r>
               <a:rPr lang="en-US" dirty="0"/>
-              <a:t>A deep dive, or in any way comprehensive</a:t>
-            </a:r>
-          </a:p>
-          <a:p>
-            <a:r>
-              <a:rPr lang="en-US" dirty="0"/>
-              <a:t>Thorough</a:t>
-            </a:r>
+              <a:t>A deep dive, or in any </a:t>
+            </a:r>
+            <a:r>
+              <a:rPr lang="en-US"/>
+              <a:t>way comprehensive</a:t>
+            </a:r>
+            <a:endParaRPr lang="en-US" dirty="0"/>
           </a:p>
           <a:p>
             <a:r>
@@ -6371,67 +6366,6 @@
                       </p:childTnLst>
                     </p:cTn>
                   </p:par>
-                  <p:par>
-                    <p:cTn id="50" fill="hold">
-                      <p:stCondLst>
-                        <p:cond delay="indefinite"/>
-                      </p:stCondLst>
-                      <p:childTnLst>
-                        <p:par>
-                          <p:cTn id="51" fill="hold">
-                            <p:stCondLst>
-                              <p:cond delay="0"/>
-                            </p:stCondLst>
-                            <p:childTnLst>
-                              <p:par>
-                                <p:cTn id="52" presetID="10" presetClass="entr" presetSubtype="0" fill="hold" nodeType="clickEffect">
-                                  <p:stCondLst>
-                                    <p:cond delay="0"/>
-                                  </p:stCondLst>
-                                  <p:childTnLst>
-                                    <p:set>
-                                      <p:cBhvr>
-                                        <p:cTn id="53" dur="1" fill="hold">
-                                          <p:stCondLst>
-                                            <p:cond delay="0"/>
-                                          </p:stCondLst>
-                                        </p:cTn>
-                                        <p:tgtEl>
-                                          <p:spTgt spid="6">
-                                            <p:txEl>
-                                              <p:pRg st="3" end="3"/>
-                                            </p:txEl>
-                                          </p:spTgt>
-                                        </p:tgtEl>
-                                        <p:attrNameLst>
-                                          <p:attrName>style.visibility</p:attrName>
-                                        </p:attrNameLst>
-                                      </p:cBhvr>
-                                      <p:to>
-                                        <p:strVal val="visible"/>
-                                      </p:to>
-                                    </p:set>
-                                    <p:animEffect transition="in" filter="fade">
-                                      <p:cBhvr>
-                                        <p:cTn id="54" dur="500"/>
-                                        <p:tgtEl>
-                                          <p:spTgt spid="6">
-                                            <p:txEl>
-                                              <p:pRg st="3" end="3"/>
-                                            </p:txEl>
-                                          </p:spTgt>
-                                        </p:tgtEl>
-                                      </p:cBhvr>
-                                    </p:animEffect>
-                                  </p:childTnLst>
-                                </p:cTn>
-                              </p:par>
-                            </p:childTnLst>
-                          </p:cTn>
-                        </p:par>
-                      </p:childTnLst>
-                    </p:cTn>
-                  </p:par>
                 </p:childTnLst>
               </p:cTn>
               <p:prevCondLst>
@@ -7344,6 +7278,332 @@
   <p:clrMapOvr>
     <a:overrideClrMapping bg1="dk1" tx1="lt1" bg2="dk2" tx2="lt2" accent1="accent1" accent2="accent2" accent3="accent3" accent4="accent4" accent5="accent5" accent6="accent6" hlink="hlink" folHlink="folHlink"/>
   </p:clrMapOvr>
+  <p:timing>
+    <p:tnLst>
+      <p:par>
+        <p:cTn id="1" dur="indefinite" restart="never" nodeType="tmRoot">
+          <p:childTnLst>
+            <p:seq concurrent="1" nextAc="seek">
+              <p:cTn id="2" dur="indefinite" nodeType="mainSeq">
+                <p:childTnLst>
+                  <p:par>
+                    <p:cTn id="3" fill="hold">
+                      <p:stCondLst>
+                        <p:cond delay="indefinite"/>
+                      </p:stCondLst>
+                      <p:childTnLst>
+                        <p:par>
+                          <p:cTn id="4" fill="hold">
+                            <p:stCondLst>
+                              <p:cond delay="0"/>
+                            </p:stCondLst>
+                            <p:childTnLst>
+                              <p:par>
+                                <p:cTn id="5" presetID="10" presetClass="entr" presetSubtype="0" fill="hold" nodeType="clickEffect">
+                                  <p:stCondLst>
+                                    <p:cond delay="0"/>
+                                  </p:stCondLst>
+                                  <p:childTnLst>
+                                    <p:set>
+                                      <p:cBhvr>
+                                        <p:cTn id="6" dur="1" fill="hold">
+                                          <p:stCondLst>
+                                            <p:cond delay="0"/>
+                                          </p:stCondLst>
+                                        </p:cTn>
+                                        <p:tgtEl>
+                                          <p:spTgt spid="4">
+                                            <p:txEl>
+                                              <p:pRg st="0" end="0"/>
+                                            </p:txEl>
+                                          </p:spTgt>
+                                        </p:tgtEl>
+                                        <p:attrNameLst>
+                                          <p:attrName>style.visibility</p:attrName>
+                                        </p:attrNameLst>
+                                      </p:cBhvr>
+                                      <p:to>
+                                        <p:strVal val="visible"/>
+                                      </p:to>
+                                    </p:set>
+                                    <p:animEffect transition="in" filter="fade">
+                                      <p:cBhvr>
+                                        <p:cTn id="7" dur="500"/>
+                                        <p:tgtEl>
+                                          <p:spTgt spid="4">
+                                            <p:txEl>
+                                              <p:pRg st="0" end="0"/>
+                                            </p:txEl>
+                                          </p:spTgt>
+                                        </p:tgtEl>
+                                      </p:cBhvr>
+                                    </p:animEffect>
+                                  </p:childTnLst>
+                                </p:cTn>
+                              </p:par>
+                            </p:childTnLst>
+                          </p:cTn>
+                        </p:par>
+                      </p:childTnLst>
+                    </p:cTn>
+                  </p:par>
+                  <p:par>
+                    <p:cTn id="8" fill="hold">
+                      <p:stCondLst>
+                        <p:cond delay="indefinite"/>
+                      </p:stCondLst>
+                      <p:childTnLst>
+                        <p:par>
+                          <p:cTn id="9" fill="hold">
+                            <p:stCondLst>
+                              <p:cond delay="0"/>
+                            </p:stCondLst>
+                            <p:childTnLst>
+                              <p:par>
+                                <p:cTn id="10" presetID="10" presetClass="entr" presetSubtype="0" fill="hold" nodeType="clickEffect">
+                                  <p:stCondLst>
+                                    <p:cond delay="0"/>
+                                  </p:stCondLst>
+                                  <p:childTnLst>
+                                    <p:set>
+                                      <p:cBhvr>
+                                        <p:cTn id="11" dur="1" fill="hold">
+                                          <p:stCondLst>
+                                            <p:cond delay="0"/>
+                                          </p:stCondLst>
+                                        </p:cTn>
+                                        <p:tgtEl>
+                                          <p:spTgt spid="4">
+                                            <p:txEl>
+                                              <p:pRg st="2" end="2"/>
+                                            </p:txEl>
+                                          </p:spTgt>
+                                        </p:tgtEl>
+                                        <p:attrNameLst>
+                                          <p:attrName>style.visibility</p:attrName>
+                                        </p:attrNameLst>
+                                      </p:cBhvr>
+                                      <p:to>
+                                        <p:strVal val="visible"/>
+                                      </p:to>
+                                    </p:set>
+                                    <p:animEffect transition="in" filter="fade">
+                                      <p:cBhvr>
+                                        <p:cTn id="12" dur="500"/>
+                                        <p:tgtEl>
+                                          <p:spTgt spid="4">
+                                            <p:txEl>
+                                              <p:pRg st="2" end="2"/>
+                                            </p:txEl>
+                                          </p:spTgt>
+                                        </p:tgtEl>
+                                      </p:cBhvr>
+                                    </p:animEffect>
+                                  </p:childTnLst>
+                                </p:cTn>
+                              </p:par>
+                            </p:childTnLst>
+                          </p:cTn>
+                        </p:par>
+                        <p:par>
+                          <p:cTn id="13" fill="hold">
+                            <p:stCondLst>
+                              <p:cond delay="500"/>
+                            </p:stCondLst>
+                            <p:childTnLst>
+                              <p:par>
+                                <p:cTn id="14" presetID="10" presetClass="entr" presetSubtype="0" fill="hold" nodeType="afterEffect">
+                                  <p:stCondLst>
+                                    <p:cond delay="0"/>
+                                  </p:stCondLst>
+                                  <p:childTnLst>
+                                    <p:set>
+                                      <p:cBhvr>
+                                        <p:cTn id="15" dur="1" fill="hold">
+                                          <p:stCondLst>
+                                            <p:cond delay="0"/>
+                                          </p:stCondLst>
+                                        </p:cTn>
+                                        <p:tgtEl>
+                                          <p:spTgt spid="4">
+                                            <p:txEl>
+                                              <p:pRg st="3" end="3"/>
+                                            </p:txEl>
+                                          </p:spTgt>
+                                        </p:tgtEl>
+                                        <p:attrNameLst>
+                                          <p:attrName>style.visibility</p:attrName>
+                                        </p:attrNameLst>
+                                      </p:cBhvr>
+                                      <p:to>
+                                        <p:strVal val="visible"/>
+                                      </p:to>
+                                    </p:set>
+                                    <p:animEffect transition="in" filter="fade">
+                                      <p:cBhvr>
+                                        <p:cTn id="16" dur="500"/>
+                                        <p:tgtEl>
+                                          <p:spTgt spid="4">
+                                            <p:txEl>
+                                              <p:pRg st="3" end="3"/>
+                                            </p:txEl>
+                                          </p:spTgt>
+                                        </p:tgtEl>
+                                      </p:cBhvr>
+                                    </p:animEffect>
+                                  </p:childTnLst>
+                                </p:cTn>
+                              </p:par>
+                            </p:childTnLst>
+                          </p:cTn>
+                        </p:par>
+                      </p:childTnLst>
+                    </p:cTn>
+                  </p:par>
+                  <p:par>
+                    <p:cTn id="17" fill="hold">
+                      <p:stCondLst>
+                        <p:cond delay="indefinite"/>
+                      </p:stCondLst>
+                      <p:childTnLst>
+                        <p:par>
+                          <p:cTn id="18" fill="hold">
+                            <p:stCondLst>
+                              <p:cond delay="0"/>
+                            </p:stCondLst>
+                            <p:childTnLst>
+                              <p:par>
+                                <p:cTn id="19" presetID="10" presetClass="entr" presetSubtype="0" fill="hold" nodeType="clickEffect">
+                                  <p:stCondLst>
+                                    <p:cond delay="0"/>
+                                  </p:stCondLst>
+                                  <p:childTnLst>
+                                    <p:set>
+                                      <p:cBhvr>
+                                        <p:cTn id="20" dur="1" fill="hold">
+                                          <p:stCondLst>
+                                            <p:cond delay="0"/>
+                                          </p:stCondLst>
+                                        </p:cTn>
+                                        <p:tgtEl>
+                                          <p:spTgt spid="4">
+                                            <p:txEl>
+                                              <p:pRg st="5" end="5"/>
+                                            </p:txEl>
+                                          </p:spTgt>
+                                        </p:tgtEl>
+                                        <p:attrNameLst>
+                                          <p:attrName>style.visibility</p:attrName>
+                                        </p:attrNameLst>
+                                      </p:cBhvr>
+                                      <p:to>
+                                        <p:strVal val="visible"/>
+                                      </p:to>
+                                    </p:set>
+                                    <p:animEffect transition="in" filter="fade">
+                                      <p:cBhvr>
+                                        <p:cTn id="21" dur="500"/>
+                                        <p:tgtEl>
+                                          <p:spTgt spid="4">
+                                            <p:txEl>
+                                              <p:pRg st="5" end="5"/>
+                                            </p:txEl>
+                                          </p:spTgt>
+                                        </p:tgtEl>
+                                      </p:cBhvr>
+                                    </p:animEffect>
+                                  </p:childTnLst>
+                                </p:cTn>
+                              </p:par>
+                            </p:childTnLst>
+                          </p:cTn>
+                        </p:par>
+                      </p:childTnLst>
+                    </p:cTn>
+                  </p:par>
+                  <p:par>
+                    <p:cTn id="22" fill="hold">
+                      <p:stCondLst>
+                        <p:cond delay="indefinite"/>
+                      </p:stCondLst>
+                      <p:childTnLst>
+                        <p:par>
+                          <p:cTn id="23" fill="hold">
+                            <p:stCondLst>
+                              <p:cond delay="0"/>
+                            </p:stCondLst>
+                            <p:childTnLst>
+                              <p:par>
+                                <p:cTn id="24" presetID="10" presetClass="entr" presetSubtype="0" fill="hold" nodeType="clickEffect">
+                                  <p:stCondLst>
+                                    <p:cond delay="0"/>
+                                  </p:stCondLst>
+                                  <p:childTnLst>
+                                    <p:set>
+                                      <p:cBhvr>
+                                        <p:cTn id="25" dur="1" fill="hold">
+                                          <p:stCondLst>
+                                            <p:cond delay="0"/>
+                                          </p:stCondLst>
+                                        </p:cTn>
+                                        <p:tgtEl>
+                                          <p:spTgt spid="4">
+                                            <p:txEl>
+                                              <p:pRg st="7" end="7"/>
+                                            </p:txEl>
+                                          </p:spTgt>
+                                        </p:tgtEl>
+                                        <p:attrNameLst>
+                                          <p:attrName>style.visibility</p:attrName>
+                                        </p:attrNameLst>
+                                      </p:cBhvr>
+                                      <p:to>
+                                        <p:strVal val="visible"/>
+                                      </p:to>
+                                    </p:set>
+                                    <p:animEffect transition="in" filter="fade">
+                                      <p:cBhvr>
+                                        <p:cTn id="26" dur="500"/>
+                                        <p:tgtEl>
+                                          <p:spTgt spid="4">
+                                            <p:txEl>
+                                              <p:pRg st="7" end="7"/>
+                                            </p:txEl>
+                                          </p:spTgt>
+                                        </p:tgtEl>
+                                      </p:cBhvr>
+                                    </p:animEffect>
+                                  </p:childTnLst>
+                                </p:cTn>
+                              </p:par>
+                            </p:childTnLst>
+                          </p:cTn>
+                        </p:par>
+                      </p:childTnLst>
+                    </p:cTn>
+                  </p:par>
+                </p:childTnLst>
+              </p:cTn>
+              <p:prevCondLst>
+                <p:cond evt="onPrev" delay="0">
+                  <p:tgtEl>
+                    <p:sldTgt/>
+                  </p:tgtEl>
+                </p:cond>
+              </p:prevCondLst>
+              <p:nextCondLst>
+                <p:cond evt="onNext" delay="0">
+                  <p:tgtEl>
+                    <p:sldTgt/>
+                  </p:tgtEl>
+                </p:cond>
+              </p:nextCondLst>
+            </p:seq>
+          </p:childTnLst>
+        </p:cTn>
+      </p:par>
+    </p:tnLst>
+  </p:timing>
 </p:sld>
 </file>
 

</xml_diff>